<commit_message>
Uploading the state from 2025
</commit_message>
<xml_diff>
--- a/public/templates/template.pptx
+++ b/public/templates/template.pptx
@@ -6754,8 +6754,8 @@
         </p:nvSpPr>
         <p:spPr bwMode="auto">
           <a:xfrm>
-            <a:off x="5643563" y="5717321"/>
-            <a:ext cx="904875" cy="799156"/>
+            <a:off x="5336138" y="5717321"/>
+            <a:ext cx="1519725" cy="799156"/>
           </a:xfrm>
           <a:prstGeom prst="rect">
             <a:avLst/>

</xml_diff>